<commit_message>
reformatted the documentation as per requirements and criticisms; will add some more features in classification in future, this is the final commit of the internship I guess yay!
</commit_message>
<xml_diff>
--- a/docs/Presentation1.pptx
+++ b/docs/Presentation1.pptx
@@ -15,6 +15,7 @@
     <p:sldId id="265" r:id="rId10"/>
     <p:sldId id="264" r:id="rId11"/>
     <p:sldId id="262" r:id="rId12"/>
+    <p:sldId id="266" r:id="rId13"/>
   </p:sldIdLst>
   <p:sldSz cx="12192000" cy="6858000"/>
   <p:notesSz cx="6858000" cy="9144000"/>
@@ -3107,9 +3108,46 @@
         <p:nvPr/>
       </p:nvGrpSpPr>
       <p:grpSpPr/>
+      <p:sp>
+        <p:nvSpPr>
+          <p:cNvPr id="7" name="Text Box 6"/>
+          <p:cNvSpPr txBox="1"/>
+          <p:nvPr/>
+        </p:nvSpPr>
+        <p:spPr>
+          <a:xfrm>
+            <a:off x="694690" y="2856865"/>
+            <a:ext cx="3787775" cy="572770"/>
+          </a:xfrm>
+          <a:prstGeom prst="rect">
+            <a:avLst/>
+          </a:prstGeom>
+          <a:noFill/>
+        </p:spPr>
+        <p:txBody>
+          <a:bodyPr wrap="square" rtlCol="0">
+            <a:noAutofit/>
+          </a:bodyPr>
+          <a:p>
+            <a:r>
+              <a:rPr lang="en-US" sz="2800" b="1">
+                <a:solidFill>
+                  <a:schemeClr val="bg1"/>
+                </a:solidFill>
+              </a:rPr>
+              <a:t>Siddhesh Bhatt</a:t>
+            </a:r>
+            <a:endParaRPr lang="en-US" sz="2800" b="1">
+              <a:solidFill>
+                <a:schemeClr val="bg1"/>
+              </a:solidFill>
+            </a:endParaRPr>
+          </a:p>
+        </p:txBody>
+      </p:sp>
       <p:pic>
         <p:nvPicPr>
-          <p:cNvPr id="6" name="Picture 5"/>
+          <p:cNvPr id="2" name="Picture 1"/>
           <p:cNvPicPr>
             <a:picLocks noChangeAspect="1"/>
           </p:cNvPicPr>
@@ -3124,7 +3162,7 @@
         <p:spPr>
           <a:xfrm>
             <a:off x="0" y="-635"/>
-            <a:ext cx="12192000" cy="6858000"/>
+            <a:ext cx="12192000" cy="6137910"/>
           </a:xfrm>
           <a:prstGeom prst="rect">
             <a:avLst/>
@@ -3133,14 +3171,14 @@
       </p:pic>
       <p:sp>
         <p:nvSpPr>
-          <p:cNvPr id="7" name="Text Box 6"/>
+          <p:cNvPr id="3" name="Text Box 2"/>
           <p:cNvSpPr txBox="1"/>
           <p:nvPr/>
         </p:nvSpPr>
         <p:spPr>
           <a:xfrm>
-            <a:off x="694690" y="2856865"/>
-            <a:ext cx="3787775" cy="572770"/>
+            <a:off x="486410" y="2990850"/>
+            <a:ext cx="5320665" cy="583565"/>
           </a:xfrm>
           <a:prstGeom prst="rect">
             <a:avLst/>
@@ -3149,18 +3187,18 @@
         </p:spPr>
         <p:txBody>
           <a:bodyPr wrap="square" rtlCol="0">
-            <a:noAutofit/>
+            <a:spAutoFit/>
           </a:bodyPr>
           <a:p>
             <a:r>
-              <a:rPr lang="en-US" sz="2800" b="1">
+              <a:rPr lang="en-US" sz="3200" b="1">
                 <a:solidFill>
                   <a:schemeClr val="bg1"/>
                 </a:solidFill>
               </a:rPr>
               <a:t>Siddhesh Bhatt</a:t>
             </a:r>
-            <a:endParaRPr lang="en-US" sz="2800" b="1">
+            <a:endParaRPr lang="en-US" sz="3200" b="1">
               <a:solidFill>
                 <a:schemeClr val="bg1"/>
               </a:solidFill>
@@ -3337,6 +3375,67 @@
               <a:t>Achieves strong accuracy while requiring fewer computational resources compared to traditional CNN architectures.</a:t>
             </a:r>
             <a:endParaRPr lang="en-US"/>
+          </a:p>
+        </p:txBody>
+      </p:sp>
+    </p:spTree>
+  </p:cSld>
+  <p:clrMapOvr>
+    <a:masterClrMapping/>
+  </p:clrMapOvr>
+</p:sld>
+</file>
+
+<file path=ppt/slides/slide11.xml><?xml version="1.0" encoding="utf-8"?>
+<p:sld xmlns:a="http://schemas.openxmlformats.org/drawingml/2006/main" xmlns:r="http://schemas.openxmlformats.org/officeDocument/2006/relationships" xmlns:p="http://schemas.openxmlformats.org/presentationml/2006/main">
+  <p:cSld>
+    <p:spTree>
+      <p:nvGrpSpPr>
+        <p:cNvPr id="1" name=""/>
+        <p:cNvGrpSpPr/>
+        <p:nvPr/>
+      </p:nvGrpSpPr>
+      <p:grpSpPr/>
+      <p:sp>
+        <p:nvSpPr>
+          <p:cNvPr id="2" name="Rounded Rectangle 1"/>
+          <p:cNvSpPr/>
+          <p:nvPr/>
+        </p:nvSpPr>
+        <p:spPr>
+          <a:xfrm>
+            <a:off x="1773555" y="1617345"/>
+            <a:ext cx="7628255" cy="3064510"/>
+          </a:xfrm>
+          <a:prstGeom prst="roundRect">
+            <a:avLst/>
+          </a:prstGeom>
+        </p:spPr>
+        <p:style>
+          <a:lnRef idx="2">
+            <a:schemeClr val="accent1">
+              <a:lumMod val="75000"/>
+            </a:schemeClr>
+          </a:lnRef>
+          <a:fillRef idx="1">
+            <a:schemeClr val="accent1"/>
+          </a:fillRef>
+          <a:effectRef idx="0">
+            <a:srgbClr val="FFFFFF"/>
+          </a:effectRef>
+          <a:fontRef idx="minor">
+            <a:schemeClr val="lt1"/>
+          </a:fontRef>
+        </p:style>
+        <p:txBody>
+          <a:bodyPr rtlCol="0" anchor="ctr"/>
+          <a:p>
+            <a:pPr algn="ctr"/>
+            <a:r>
+              <a:rPr lang="en-US" sz="9600"/>
+              <a:t>Thank You</a:t>
+            </a:r>
+            <a:endParaRPr lang="en-US" sz="9600"/>
           </a:p>
         </p:txBody>
       </p:sp>
@@ -3958,7 +4057,7 @@
             <a:pPr algn="ctr"/>
             <a:r>
               <a:rPr lang="en-US"/>
-              <a:t>labeled image is displayed and made ready for download</a:t>
+              <a:t>image is displayed to the user along with %age prediction of localized features</a:t>
             </a:r>
             <a:endParaRPr lang="en-US"/>
           </a:p>

</xml_diff>